<commit_message>
Add Readme and cleanup
</commit_message>
<xml_diff>
--- a/datascience.pptx
+++ b/datascience.pptx
@@ -128,6 +128,11 @@
       </a:defRPr>
     </a:lvl9pPr>
   </p:defaultTextStyle>
+  <p:extLst>
+    <p:ext uri="{EFAFB233-063F-42B5-8137-9DF3F51BA10A}">
+      <p15:sldGuideLst xmlns:p15="http://schemas.microsoft.com/office/powerpoint/2012/main"/>
+    </p:ext>
+  </p:extLst>
 </p:presentation>
 </file>
 
@@ -213,7 +218,7 @@
           <a:p>
             <a:fld id="{1EB7AC2C-D393-F649-9CEE-676BD895F9CA}" type="datetimeFigureOut">
               <a:rPr kumimoji="1" lang="zh-TW" altLang="en-US" smtClean="0"/>
-              <a:t>2020/1/6</a:t>
+              <a:t>2020/11/10</a:t>
             </a:fld>
             <a:endParaRPr kumimoji="1" lang="zh-TW" altLang="en-US"/>
           </a:p>
@@ -900,7 +905,7 @@
           <a:p>
             <a:fld id="{1E51EE1D-5C10-B04B-BBF6-33AFB93DBF72}" type="datetimeFigureOut">
               <a:rPr kumimoji="1" lang="zh-TW" altLang="en-US" smtClean="0"/>
-              <a:t>2020/1/6</a:t>
+              <a:t>2020/11/10</a:t>
             </a:fld>
             <a:endParaRPr kumimoji="1" lang="zh-TW" altLang="en-US"/>
           </a:p>
@@ -1073,7 +1078,7 @@
           <a:p>
             <a:fld id="{1E51EE1D-5C10-B04B-BBF6-33AFB93DBF72}" type="datetimeFigureOut">
               <a:rPr kumimoji="1" lang="zh-TW" altLang="en-US" smtClean="0"/>
-              <a:t>2020/1/6</a:t>
+              <a:t>2020/11/10</a:t>
             </a:fld>
             <a:endParaRPr kumimoji="1" lang="zh-TW" altLang="en-US"/>
           </a:p>
@@ -1256,7 +1261,7 @@
           <a:p>
             <a:fld id="{1E51EE1D-5C10-B04B-BBF6-33AFB93DBF72}" type="datetimeFigureOut">
               <a:rPr kumimoji="1" lang="zh-TW" altLang="en-US" smtClean="0"/>
-              <a:t>2020/1/6</a:t>
+              <a:t>2020/11/10</a:t>
             </a:fld>
             <a:endParaRPr kumimoji="1" lang="zh-TW" altLang="en-US"/>
           </a:p>
@@ -1429,7 +1434,7 @@
           <a:p>
             <a:fld id="{1E51EE1D-5C10-B04B-BBF6-33AFB93DBF72}" type="datetimeFigureOut">
               <a:rPr kumimoji="1" lang="zh-TW" altLang="en-US" smtClean="0"/>
-              <a:t>2020/1/6</a:t>
+              <a:t>2020/11/10</a:t>
             </a:fld>
             <a:endParaRPr kumimoji="1" lang="zh-TW" altLang="en-US"/>
           </a:p>
@@ -1707,7 +1712,7 @@
           <a:p>
             <a:fld id="{1E51EE1D-5C10-B04B-BBF6-33AFB93DBF72}" type="datetimeFigureOut">
               <a:rPr kumimoji="1" lang="zh-TW" altLang="en-US" smtClean="0"/>
-              <a:t>2020/1/6</a:t>
+              <a:t>2020/11/10</a:t>
             </a:fld>
             <a:endParaRPr kumimoji="1" lang="zh-TW" altLang="en-US"/>
           </a:p>
@@ -1922,7 +1927,7 @@
           <a:p>
             <a:fld id="{1E51EE1D-5C10-B04B-BBF6-33AFB93DBF72}" type="datetimeFigureOut">
               <a:rPr kumimoji="1" lang="zh-TW" altLang="en-US" smtClean="0"/>
-              <a:t>2020/1/6</a:t>
+              <a:t>2020/11/10</a:t>
             </a:fld>
             <a:endParaRPr kumimoji="1" lang="zh-TW" altLang="en-US"/>
           </a:p>
@@ -2290,7 +2295,7 @@
           <a:p>
             <a:fld id="{1E51EE1D-5C10-B04B-BBF6-33AFB93DBF72}" type="datetimeFigureOut">
               <a:rPr kumimoji="1" lang="zh-TW" altLang="en-US" smtClean="0"/>
-              <a:t>2020/1/6</a:t>
+              <a:t>2020/11/10</a:t>
             </a:fld>
             <a:endParaRPr kumimoji="1" lang="zh-TW" altLang="en-US"/>
           </a:p>
@@ -2431,7 +2436,7 @@
           <a:p>
             <a:fld id="{1E51EE1D-5C10-B04B-BBF6-33AFB93DBF72}" type="datetimeFigureOut">
               <a:rPr kumimoji="1" lang="zh-TW" altLang="en-US" smtClean="0"/>
-              <a:t>2020/1/6</a:t>
+              <a:t>2020/11/10</a:t>
             </a:fld>
             <a:endParaRPr kumimoji="1" lang="zh-TW" altLang="en-US"/>
           </a:p>
@@ -2544,7 +2549,7 @@
           <a:p>
             <a:fld id="{1E51EE1D-5C10-B04B-BBF6-33AFB93DBF72}" type="datetimeFigureOut">
               <a:rPr kumimoji="1" lang="zh-TW" altLang="en-US" smtClean="0"/>
-              <a:t>2020/1/6</a:t>
+              <a:t>2020/11/10</a:t>
             </a:fld>
             <a:endParaRPr kumimoji="1" lang="zh-TW" altLang="en-US"/>
           </a:p>
@@ -2833,7 +2838,7 @@
           <a:p>
             <a:fld id="{1E51EE1D-5C10-B04B-BBF6-33AFB93DBF72}" type="datetimeFigureOut">
               <a:rPr kumimoji="1" lang="zh-TW" altLang="en-US" smtClean="0"/>
-              <a:t>2020/1/6</a:t>
+              <a:t>2020/11/10</a:t>
             </a:fld>
             <a:endParaRPr kumimoji="1" lang="zh-TW" altLang="en-US"/>
           </a:p>
@@ -3124,7 +3129,7 @@
           <a:p>
             <a:fld id="{1E51EE1D-5C10-B04B-BBF6-33AFB93DBF72}" type="datetimeFigureOut">
               <a:rPr kumimoji="1" lang="zh-TW" altLang="en-US" smtClean="0"/>
-              <a:t>2020/1/6</a:t>
+              <a:t>2020/11/10</a:t>
             </a:fld>
             <a:endParaRPr kumimoji="1" lang="zh-TW" altLang="en-US"/>
           </a:p>
@@ -3340,7 +3345,7 @@
           <a:p>
             <a:fld id="{1E51EE1D-5C10-B04B-BBF6-33AFB93DBF72}" type="datetimeFigureOut">
               <a:rPr kumimoji="1" lang="zh-TW" altLang="en-US" smtClean="0"/>
-              <a:t>2020/1/6</a:t>
+              <a:t>2020/11/10</a:t>
             </a:fld>
             <a:endParaRPr kumimoji="1" lang="zh-TW" altLang="en-US"/>
           </a:p>
@@ -3778,7 +3783,11 @@
           <a:bodyPr/>
           <a:lstStyle/>
           <a:p>
-            <a:endParaRPr kumimoji="1" lang="zh-TW" altLang="en-US"/>
+            <a:r>
+              <a:rPr kumimoji="1" lang="en" altLang="zh-TW" dirty="0"/>
+              <a:t>Simple Movie Recommendation System</a:t>
+            </a:r>
+            <a:endParaRPr kumimoji="1" lang="zh-TW" altLang="en-US" dirty="0"/>
           </a:p>
         </p:txBody>
       </p:sp>

</xml_diff>